<commit_message>
Correct the purpose of the work
</commit_message>
<xml_diff>
--- a/documents/Презентация по итогам 1 этапа.pptx
+++ b/documents/Презентация по итогам 1 этапа.pptx
@@ -240,7 +240,7 @@
           <a:p>
             <a:fld id="{98494AC9-B582-4E30-BF70-DAB33555D147}" type="datetimeFigureOut">
               <a:rPr lang="ru-RU" smtClean="0"/>
-              <a:t>30.03.2023</a:t>
+              <a:t>31.03.2023</a:t>
             </a:fld>
             <a:endParaRPr lang="ru-RU"/>
           </a:p>
@@ -417,7 +417,7 @@
           <a:p>
             <a:fld id="{4F26C57A-F9F8-4BB2-8786-8AEB53317034}" type="datetimeFigureOut">
               <a:rPr lang="ru-RU" smtClean="0"/>
-              <a:t>30.03.2023</a:t>
+              <a:t>31.03.2023</a:t>
             </a:fld>
             <a:endParaRPr lang="ru-RU"/>
           </a:p>
@@ -831,7 +831,7 @@
           <a:p>
             <a:fld id="{C697EBFA-3257-4BD3-8E86-72EEC0144A6B}" type="datetime1">
               <a:rPr lang="ru-RU" smtClean="0"/>
-              <a:t>30.03.2023</a:t>
+              <a:t>31.03.2023</a:t>
             </a:fld>
             <a:endParaRPr lang="ru-RU"/>
           </a:p>
@@ -1029,7 +1029,7 @@
           <a:p>
             <a:fld id="{87C2925A-6812-447B-9A6E-6DF2EEE100C6}" type="datetime1">
               <a:rPr lang="ru-RU" smtClean="0"/>
-              <a:t>30.03.2023</a:t>
+              <a:t>31.03.2023</a:t>
             </a:fld>
             <a:endParaRPr lang="ru-RU"/>
           </a:p>
@@ -1237,7 +1237,7 @@
           <a:p>
             <a:fld id="{2CAAB5DF-F7FE-4781-8E0F-6D5154FFD6CA}" type="datetime1">
               <a:rPr lang="ru-RU" smtClean="0"/>
-              <a:t>30.03.2023</a:t>
+              <a:t>31.03.2023</a:t>
             </a:fld>
             <a:endParaRPr lang="ru-RU"/>
           </a:p>
@@ -1435,7 +1435,7 @@
           <a:p>
             <a:fld id="{486D8F8F-CC06-4405-A57B-92C8637DABBC}" type="datetime1">
               <a:rPr lang="ru-RU" smtClean="0"/>
-              <a:t>30.03.2023</a:t>
+              <a:t>31.03.2023</a:t>
             </a:fld>
             <a:endParaRPr lang="ru-RU"/>
           </a:p>
@@ -1710,7 +1710,7 @@
           <a:p>
             <a:fld id="{7C75167C-231F-4D24-9F27-C24D8F5E57F3}" type="datetime1">
               <a:rPr lang="ru-RU" smtClean="0"/>
-              <a:t>30.03.2023</a:t>
+              <a:t>31.03.2023</a:t>
             </a:fld>
             <a:endParaRPr lang="ru-RU"/>
           </a:p>
@@ -1975,7 +1975,7 @@
           <a:p>
             <a:fld id="{EDEC576D-9E7B-4AB3-B270-CF75E62D0544}" type="datetime1">
               <a:rPr lang="ru-RU" smtClean="0"/>
-              <a:t>30.03.2023</a:t>
+              <a:t>31.03.2023</a:t>
             </a:fld>
             <a:endParaRPr lang="ru-RU"/>
           </a:p>
@@ -2387,7 +2387,7 @@
           <a:p>
             <a:fld id="{1384FC40-CC4D-4F80-9EF6-19369D2D6B54}" type="datetime1">
               <a:rPr lang="ru-RU" smtClean="0"/>
-              <a:t>30.03.2023</a:t>
+              <a:t>31.03.2023</a:t>
             </a:fld>
             <a:endParaRPr lang="ru-RU"/>
           </a:p>
@@ -2528,7 +2528,7 @@
           <a:p>
             <a:fld id="{9AEDA20A-571C-46EA-B3BC-2E573D0862DC}" type="datetime1">
               <a:rPr lang="ru-RU" smtClean="0"/>
-              <a:t>30.03.2023</a:t>
+              <a:t>31.03.2023</a:t>
             </a:fld>
             <a:endParaRPr lang="ru-RU"/>
           </a:p>
@@ -2641,7 +2641,7 @@
           <a:p>
             <a:fld id="{A912D36E-60FE-4AF5-9AE6-F9F5172B1C32}" type="datetime1">
               <a:rPr lang="ru-RU" smtClean="0"/>
-              <a:t>30.03.2023</a:t>
+              <a:t>31.03.2023</a:t>
             </a:fld>
             <a:endParaRPr lang="ru-RU"/>
           </a:p>
@@ -2952,7 +2952,7 @@
           <a:p>
             <a:fld id="{72E57C44-ABCE-49D5-97C9-1B7C56BA5DD8}" type="datetime1">
               <a:rPr lang="ru-RU" smtClean="0"/>
-              <a:t>30.03.2023</a:t>
+              <a:t>31.03.2023</a:t>
             </a:fld>
             <a:endParaRPr lang="ru-RU"/>
           </a:p>
@@ -3240,7 +3240,7 @@
           <a:p>
             <a:fld id="{B8FC2C94-A383-4A04-A353-EF75A9EEC519}" type="datetime1">
               <a:rPr lang="ru-RU" smtClean="0"/>
-              <a:t>30.03.2023</a:t>
+              <a:t>31.03.2023</a:t>
             </a:fld>
             <a:endParaRPr lang="ru-RU"/>
           </a:p>
@@ -3481,7 +3481,7 @@
           <a:p>
             <a:fld id="{BD9B8EAF-96FC-4C5C-9F6B-6D6D26D1FFB9}" type="datetime1">
               <a:rPr lang="ru-RU" smtClean="0"/>
-              <a:t>30.03.2023</a:t>
+              <a:t>31.03.2023</a:t>
             </a:fld>
             <a:endParaRPr lang="ru-RU"/>
           </a:p>
@@ -5743,7 +5743,7 @@
         </p:nvSpPr>
         <p:spPr>
           <a:xfrm>
-            <a:off x="838200" y="365126"/>
+            <a:off x="838199" y="378697"/>
             <a:ext cx="10515600" cy="649027"/>
           </a:xfrm>
         </p:spPr>
@@ -5782,8 +5782,8 @@
         </p:nvSpPr>
         <p:spPr>
           <a:xfrm>
-            <a:off x="731982" y="2225833"/>
-            <a:ext cx="10621817" cy="3388837"/>
+            <a:off x="731982" y="2428567"/>
+            <a:ext cx="10621817" cy="2556387"/>
           </a:xfrm>
         </p:spPr>
         <p:txBody>
@@ -5791,6 +5791,35 @@
             <a:noAutofit/>
           </a:bodyPr>
           <a:lstStyle/>
+          <a:p>
+            <a:pPr marL="0" indent="0">
+              <a:lnSpc>
+                <a:spcPct val="100000"/>
+              </a:lnSpc>
+              <a:buNone/>
+            </a:pPr>
+            <a:r>
+              <a:rPr lang="ru-RU" sz="2400" dirty="0" smtClean="0">
+                <a:latin typeface="Arial" panose="020B0604020202020204" pitchFamily="34" charset="0"/>
+                <a:cs typeface="Arial" panose="020B0604020202020204" pitchFamily="34" charset="0"/>
+              </a:rPr>
+              <a:t>Сокращение </a:t>
+            </a:r>
+            <a:r>
+              <a:rPr lang="ru-RU" sz="2400" dirty="0">
+                <a:latin typeface="Arial" panose="020B0604020202020204" pitchFamily="34" charset="0"/>
+                <a:cs typeface="Arial" panose="020B0604020202020204" pitchFamily="34" charset="0"/>
+              </a:rPr>
+              <a:t>расходов и затраченного времени </a:t>
+            </a:r>
+            <a:r>
+              <a:rPr lang="ru-RU" sz="2400" dirty="0" smtClean="0">
+                <a:latin typeface="Arial" panose="020B0604020202020204" pitchFamily="34" charset="0"/>
+                <a:cs typeface="Arial" panose="020B0604020202020204" pitchFamily="34" charset="0"/>
+              </a:rPr>
+              <a:t>относительно приема заказов:</a:t>
+            </a:r>
+          </a:p>
           <a:p>
             <a:pPr>
               <a:lnSpc>
@@ -5798,11 +5827,18 @@
               </a:lnSpc>
             </a:pPr>
             <a:r>
+              <a:rPr lang="ru-RU" sz="2400" dirty="0" smtClean="0">
+                <a:latin typeface="Arial" panose="020B0604020202020204" pitchFamily="34" charset="0"/>
+                <a:cs typeface="Arial" panose="020B0604020202020204" pitchFamily="34" charset="0"/>
+              </a:rPr>
+              <a:t>Посредством </a:t>
+            </a:r>
+            <a:r>
               <a:rPr lang="ru-RU" sz="2400" dirty="0">
                 <a:latin typeface="Arial" panose="020B0604020202020204" pitchFamily="34" charset="0"/>
                 <a:cs typeface="Arial" panose="020B0604020202020204" pitchFamily="34" charset="0"/>
               </a:rPr>
-              <a:t>Предоставить клиенту возможность выбрать и арендовать спортивное оборудование; </a:t>
+              <a:t>телефонных звонков клиентов на спортивную базу на стоимость и время телефонных звонков;</a:t>
             </a:r>
           </a:p>
           <a:p>
@@ -5812,26 +5848,23 @@
               </a:lnSpc>
             </a:pPr>
             <a:r>
+              <a:rPr lang="ru-RU" sz="2400" dirty="0" smtClean="0">
+                <a:latin typeface="Arial" panose="020B0604020202020204" pitchFamily="34" charset="0"/>
+                <a:cs typeface="Arial" panose="020B0604020202020204" pitchFamily="34" charset="0"/>
+              </a:rPr>
+              <a:t>Посредством </a:t>
+            </a:r>
+            <a:r>
               <a:rPr lang="ru-RU" sz="2400" dirty="0">
                 <a:latin typeface="Arial" panose="020B0604020202020204" pitchFamily="34" charset="0"/>
                 <a:cs typeface="Arial" panose="020B0604020202020204" pitchFamily="34" charset="0"/>
               </a:rPr>
-              <a:t>Предоставить сотруднику возможность просматривать и редактировать данные, относящиеся к прокату оборудования; </a:t>
-            </a:r>
-          </a:p>
-          <a:p>
-            <a:pPr>
-              <a:lnSpc>
-                <a:spcPct val="100000"/>
-              </a:lnSpc>
-            </a:pPr>
-            <a:r>
-              <a:rPr lang="ru-RU" sz="2400" dirty="0">
-                <a:latin typeface="Arial" panose="020B0604020202020204" pitchFamily="34" charset="0"/>
-                <a:cs typeface="Arial" panose="020B0604020202020204" pitchFamily="34" charset="0"/>
-              </a:rPr>
-              <a:t>Предоставить клиентам и сотрудникам компании дополнительную (по сравнению с существующими аналогами) функциональность, относящуюся к прокату оборудования (система рекомендаций мероприятий, «черный список»). </a:t>
-            </a:r>
+              <a:t>личного обращения клиентов на спортивную базу на стоимость оплаты работы персонала и время обслуживания клиентов.</a:t>
+            </a:r>
+            <a:endParaRPr lang="ru-RU" sz="2400" dirty="0" smtClean="0">
+              <a:latin typeface="Arial" panose="020B0604020202020204" pitchFamily="34" charset="0"/>
+              <a:cs typeface="Arial" panose="020B0604020202020204" pitchFamily="34" charset="0"/>
+            </a:endParaRPr>
           </a:p>
         </p:txBody>
       </p:sp>

</xml_diff>